<commit_message>
Added Szenarien to Präsi
</commit_message>
<xml_diff>
--- a/Zwischenpräsi.pptx
+++ b/Zwischenpräsi.pptx
@@ -26,6 +26,7 @@
     <p:sldId id="274" r:id="rId20"/>
     <p:sldId id="273" r:id="rId21"/>
     <p:sldId id="275" r:id="rId22"/>
+    <p:sldId id="278" r:id="rId23"/>
   </p:sldIdLst>
   <p:sldSz cx="12192000" cy="6858000"/>
   <p:notesSz cx="6858000" cy="9144000"/>
@@ -144,8 +145,8 @@
 <pc:chgInfo xmlns:a="http://schemas.openxmlformats.org/drawingml/2006/main" xmlns:r="http://schemas.openxmlformats.org/officeDocument/2006/relationships" xmlns:ac="http://schemas.microsoft.com/office/drawing/2013/main/command" xmlns:pc="http://schemas.microsoft.com/office/powerpoint/2013/main/command">
   <pc:docChgLst>
     <pc:chgData name="Larissa Marti" userId="62c7bf40537dc930" providerId="LiveId" clId="{9C1E72F2-0CD6-472B-8F03-8587FF8E9AEC}"/>
-    <pc:docChg chg="undo custSel addSld modSld">
-      <pc:chgData name="Larissa Marti" userId="62c7bf40537dc930" providerId="LiveId" clId="{9C1E72F2-0CD6-472B-8F03-8587FF8E9AEC}" dt="2024-11-25T20:21:40.287" v="2880" actId="20577"/>
+    <pc:docChg chg="undo custSel addSld delSld modSld">
+      <pc:chgData name="Larissa Marti" userId="62c7bf40537dc930" providerId="LiveId" clId="{9C1E72F2-0CD6-472B-8F03-8587FF8E9AEC}" dt="2024-11-27T09:09:31.033" v="3808" actId="47"/>
       <pc:docMkLst>
         <pc:docMk/>
       </pc:docMkLst>
@@ -683,7 +684,7 @@
         </pc:picChg>
       </pc:sldChg>
       <pc:sldChg chg="modSp new mod">
-        <pc:chgData name="Larissa Marti" userId="62c7bf40537dc930" providerId="LiveId" clId="{9C1E72F2-0CD6-472B-8F03-8587FF8E9AEC}" dt="2024-11-23T18:42:54.100" v="2805" actId="20577"/>
+        <pc:chgData name="Larissa Marti" userId="62c7bf40537dc930" providerId="LiveId" clId="{9C1E72F2-0CD6-472B-8F03-8587FF8E9AEC}" dt="2024-11-27T08:55:07.129" v="2924" actId="20577"/>
         <pc:sldMkLst>
           <pc:docMk/>
           <pc:sldMk cId="4030655276" sldId="275"/>
@@ -697,7 +698,7 @@
           </ac:spMkLst>
         </pc:spChg>
         <pc:spChg chg="mod">
-          <ac:chgData name="Larissa Marti" userId="62c7bf40537dc930" providerId="LiveId" clId="{9C1E72F2-0CD6-472B-8F03-8587FF8E9AEC}" dt="2024-11-23T18:42:54.100" v="2805" actId="20577"/>
+          <ac:chgData name="Larissa Marti" userId="62c7bf40537dc930" providerId="LiveId" clId="{9C1E72F2-0CD6-472B-8F03-8587FF8E9AEC}" dt="2024-11-27T08:55:07.129" v="2924" actId="20577"/>
           <ac:spMkLst>
             <pc:docMk/>
             <pc:sldMk cId="4030655276" sldId="275"/>
@@ -736,6 +737,67 @@
           </ac:picMkLst>
         </pc:picChg>
       </pc:sldChg>
+      <pc:sldChg chg="addSp new del mod">
+        <pc:chgData name="Larissa Marti" userId="62c7bf40537dc930" providerId="LiveId" clId="{9C1E72F2-0CD6-472B-8F03-8587FF8E9AEC}" dt="2024-11-27T08:57:36.666" v="3135" actId="47"/>
+        <pc:sldMkLst>
+          <pc:docMk/>
+          <pc:sldMk cId="1941961873" sldId="277"/>
+        </pc:sldMkLst>
+        <pc:picChg chg="add">
+          <ac:chgData name="Larissa Marti" userId="62c7bf40537dc930" providerId="LiveId" clId="{9C1E72F2-0CD6-472B-8F03-8587FF8E9AEC}" dt="2024-11-27T08:55:32.119" v="2926" actId="22"/>
+          <ac:picMkLst>
+            <pc:docMk/>
+            <pc:sldMk cId="1941961873" sldId="277"/>
+            <ac:picMk id="5" creationId="{DBCFC977-B3A5-3CDE-9410-7A3CEA509FE1}"/>
+          </ac:picMkLst>
+        </pc:picChg>
+      </pc:sldChg>
+      <pc:sldChg chg="modSp new mod">
+        <pc:chgData name="Larissa Marti" userId="62c7bf40537dc930" providerId="LiveId" clId="{9C1E72F2-0CD6-472B-8F03-8587FF8E9AEC}" dt="2024-11-27T09:09:28.635" v="3807"/>
+        <pc:sldMkLst>
+          <pc:docMk/>
+          <pc:sldMk cId="849351401" sldId="278"/>
+        </pc:sldMkLst>
+        <pc:spChg chg="mod">
+          <ac:chgData name="Larissa Marti" userId="62c7bf40537dc930" providerId="LiveId" clId="{9C1E72F2-0CD6-472B-8F03-8587FF8E9AEC}" dt="2024-11-27T08:57:43.526" v="3145" actId="20577"/>
+          <ac:spMkLst>
+            <pc:docMk/>
+            <pc:sldMk cId="849351401" sldId="278"/>
+            <ac:spMk id="2" creationId="{C969B7C4-8770-35DD-E0D0-3955119FB46C}"/>
+          </ac:spMkLst>
+        </pc:spChg>
+        <pc:spChg chg="mod">
+          <ac:chgData name="Larissa Marti" userId="62c7bf40537dc930" providerId="LiveId" clId="{9C1E72F2-0CD6-472B-8F03-8587FF8E9AEC}" dt="2024-11-27T09:09:28.635" v="3807"/>
+          <ac:spMkLst>
+            <pc:docMk/>
+            <pc:sldMk cId="849351401" sldId="278"/>
+            <ac:spMk id="3" creationId="{5A35876D-CCCB-4693-3BB9-0B4B22DB6007}"/>
+          </ac:spMkLst>
+        </pc:spChg>
+      </pc:sldChg>
+      <pc:sldChg chg="modSp new del mod">
+        <pc:chgData name="Larissa Marti" userId="62c7bf40537dc930" providerId="LiveId" clId="{9C1E72F2-0CD6-472B-8F03-8587FF8E9AEC}" dt="2024-11-27T09:09:31.033" v="3808" actId="47"/>
+        <pc:sldMkLst>
+          <pc:docMk/>
+          <pc:sldMk cId="598264408" sldId="279"/>
+        </pc:sldMkLst>
+        <pc:spChg chg="mod">
+          <ac:chgData name="Larissa Marti" userId="62c7bf40537dc930" providerId="LiveId" clId="{9C1E72F2-0CD6-472B-8F03-8587FF8E9AEC}" dt="2024-11-27T09:09:02.441" v="3804" actId="20577"/>
+          <ac:spMkLst>
+            <pc:docMk/>
+            <pc:sldMk cId="598264408" sldId="279"/>
+            <ac:spMk id="2" creationId="{9775D40A-3F21-AE3D-7A6C-86909E52A1EE}"/>
+          </ac:spMkLst>
+        </pc:spChg>
+        <pc:spChg chg="mod">
+          <ac:chgData name="Larissa Marti" userId="62c7bf40537dc930" providerId="LiveId" clId="{9C1E72F2-0CD6-472B-8F03-8587FF8E9AEC}" dt="2024-11-27T09:09:24.460" v="3805" actId="21"/>
+          <ac:spMkLst>
+            <pc:docMk/>
+            <pc:sldMk cId="598264408" sldId="279"/>
+            <ac:spMk id="3" creationId="{3A31568F-4D50-E44E-F5C7-0C3C13ED422F}"/>
+          </ac:spMkLst>
+        </pc:spChg>
+      </pc:sldChg>
     </pc:docChg>
   </pc:docChgLst>
 </pc:chgInfo>
@@ -890,7 +952,7 @@
           <a:p>
             <a:fld id="{4402DB6A-C008-4CDA-A8B3-E576ADA97880}" type="datetimeFigureOut">
               <a:rPr lang="de-CH" smtClean="0"/>
-              <a:t>25.11.2024</a:t>
+              <a:t>27.11.2024</a:t>
             </a:fld>
             <a:endParaRPr lang="de-CH"/>
           </a:p>
@@ -1090,7 +1152,7 @@
           <a:p>
             <a:fld id="{4402DB6A-C008-4CDA-A8B3-E576ADA97880}" type="datetimeFigureOut">
               <a:rPr lang="de-CH" smtClean="0"/>
-              <a:t>25.11.2024</a:t>
+              <a:t>27.11.2024</a:t>
             </a:fld>
             <a:endParaRPr lang="de-CH"/>
           </a:p>
@@ -1300,7 +1362,7 @@
           <a:p>
             <a:fld id="{4402DB6A-C008-4CDA-A8B3-E576ADA97880}" type="datetimeFigureOut">
               <a:rPr lang="de-CH" smtClean="0"/>
-              <a:t>25.11.2024</a:t>
+              <a:t>27.11.2024</a:t>
             </a:fld>
             <a:endParaRPr lang="de-CH"/>
           </a:p>
@@ -1500,7 +1562,7 @@
           <a:p>
             <a:fld id="{4402DB6A-C008-4CDA-A8B3-E576ADA97880}" type="datetimeFigureOut">
               <a:rPr lang="de-CH" smtClean="0"/>
-              <a:t>25.11.2024</a:t>
+              <a:t>27.11.2024</a:t>
             </a:fld>
             <a:endParaRPr lang="de-CH"/>
           </a:p>
@@ -1776,7 +1838,7 @@
           <a:p>
             <a:fld id="{4402DB6A-C008-4CDA-A8B3-E576ADA97880}" type="datetimeFigureOut">
               <a:rPr lang="de-CH" smtClean="0"/>
-              <a:t>25.11.2024</a:t>
+              <a:t>27.11.2024</a:t>
             </a:fld>
             <a:endParaRPr lang="de-CH"/>
           </a:p>
@@ -2044,7 +2106,7 @@
           <a:p>
             <a:fld id="{4402DB6A-C008-4CDA-A8B3-E576ADA97880}" type="datetimeFigureOut">
               <a:rPr lang="de-CH" smtClean="0"/>
-              <a:t>25.11.2024</a:t>
+              <a:t>27.11.2024</a:t>
             </a:fld>
             <a:endParaRPr lang="de-CH"/>
           </a:p>
@@ -2459,7 +2521,7 @@
           <a:p>
             <a:fld id="{4402DB6A-C008-4CDA-A8B3-E576ADA97880}" type="datetimeFigureOut">
               <a:rPr lang="de-CH" smtClean="0"/>
-              <a:t>25.11.2024</a:t>
+              <a:t>27.11.2024</a:t>
             </a:fld>
             <a:endParaRPr lang="de-CH"/>
           </a:p>
@@ -2601,7 +2663,7 @@
           <a:p>
             <a:fld id="{4402DB6A-C008-4CDA-A8B3-E576ADA97880}" type="datetimeFigureOut">
               <a:rPr lang="de-CH" smtClean="0"/>
-              <a:t>25.11.2024</a:t>
+              <a:t>27.11.2024</a:t>
             </a:fld>
             <a:endParaRPr lang="de-CH"/>
           </a:p>
@@ -2714,7 +2776,7 @@
           <a:p>
             <a:fld id="{4402DB6A-C008-4CDA-A8B3-E576ADA97880}" type="datetimeFigureOut">
               <a:rPr lang="de-CH" smtClean="0"/>
-              <a:t>25.11.2024</a:t>
+              <a:t>27.11.2024</a:t>
             </a:fld>
             <a:endParaRPr lang="de-CH"/>
           </a:p>
@@ -3027,7 +3089,7 @@
           <a:p>
             <a:fld id="{4402DB6A-C008-4CDA-A8B3-E576ADA97880}" type="datetimeFigureOut">
               <a:rPr lang="de-CH" smtClean="0"/>
-              <a:t>25.11.2024</a:t>
+              <a:t>27.11.2024</a:t>
             </a:fld>
             <a:endParaRPr lang="de-CH"/>
           </a:p>
@@ -3316,7 +3378,7 @@
           <a:p>
             <a:fld id="{4402DB6A-C008-4CDA-A8B3-E576ADA97880}" type="datetimeFigureOut">
               <a:rPr lang="de-CH" smtClean="0"/>
-              <a:t>25.11.2024</a:t>
+              <a:t>27.11.2024</a:t>
             </a:fld>
             <a:endParaRPr lang="de-CH"/>
           </a:p>
@@ -3559,7 +3621,7 @@
           <a:p>
             <a:fld id="{4402DB6A-C008-4CDA-A8B3-E576ADA97880}" type="datetimeFigureOut">
               <a:rPr lang="de-CH" smtClean="0"/>
-              <a:t>25.11.2024</a:t>
+              <a:t>27.11.2024</a:t>
             </a:fld>
             <a:endParaRPr lang="de-CH"/>
           </a:p>
@@ -5665,13 +5727,13 @@
           <a:p>
             <a:r>
               <a:rPr lang="de-CH" sz="2600" dirty="0"/>
-              <a:t>Vertiefung der bisherigen Analysen</a:t>
+              <a:t>Vertiefung der bisherigen Analysen – vermehrter Fokus auf Emissionen</a:t>
             </a:r>
           </a:p>
           <a:p>
             <a:r>
               <a:rPr lang="de-CH" sz="2600" dirty="0"/>
-              <a:t>Szenario-Analyse (Idee??)</a:t>
+              <a:t>Szenario-Analyse</a:t>
             </a:r>
           </a:p>
         </p:txBody>
@@ -5680,6 +5742,117 @@
     <p:extLst>
       <p:ext uri="{BB962C8B-B14F-4D97-AF65-F5344CB8AC3E}">
         <p14:creationId xmlns:p14="http://schemas.microsoft.com/office/powerpoint/2010/main" val="4030655276"/>
+      </p:ext>
+    </p:extLst>
+  </p:cSld>
+  <p:clrMapOvr>
+    <a:masterClrMapping/>
+  </p:clrMapOvr>
+</p:sld>
+</file>
+
+<file path=ppt/slides/slide22.xml><?xml version="1.0" encoding="utf-8"?>
+<p:sld xmlns:a="http://schemas.openxmlformats.org/drawingml/2006/main" xmlns:r="http://schemas.openxmlformats.org/officeDocument/2006/relationships" xmlns:p="http://schemas.openxmlformats.org/presentationml/2006/main">
+  <p:cSld>
+    <p:spTree>
+      <p:nvGrpSpPr>
+        <p:cNvPr id="1" name=""/>
+        <p:cNvGrpSpPr/>
+        <p:nvPr/>
+      </p:nvGrpSpPr>
+      <p:grpSpPr>
+        <a:xfrm>
+          <a:off x="0" y="0"/>
+          <a:ext cx="0" cy="0"/>
+          <a:chOff x="0" y="0"/>
+          <a:chExt cx="0" cy="0"/>
+        </a:xfrm>
+      </p:grpSpPr>
+      <p:sp>
+        <p:nvSpPr>
+          <p:cNvPr id="2" name="Titel 1">
+            <a:extLst>
+              <a:ext uri="{FF2B5EF4-FFF2-40B4-BE49-F238E27FC236}">
+                <a16:creationId xmlns:a16="http://schemas.microsoft.com/office/drawing/2014/main" id="{C969B7C4-8770-35DD-E0D0-3955119FB46C}"/>
+              </a:ext>
+            </a:extLst>
+          </p:cNvPr>
+          <p:cNvSpPr>
+            <a:spLocks noGrp="1"/>
+          </p:cNvSpPr>
+          <p:nvPr>
+            <p:ph type="title"/>
+          </p:nvPr>
+        </p:nvSpPr>
+        <p:spPr/>
+        <p:txBody>
+          <a:bodyPr/>
+          <a:lstStyle/>
+          <a:p>
+            <a:r>
+              <a:rPr lang="de-CH" dirty="0"/>
+              <a:t>Szenario-Analyse - Ideen</a:t>
+            </a:r>
+          </a:p>
+        </p:txBody>
+      </p:sp>
+      <p:sp>
+        <p:nvSpPr>
+          <p:cNvPr id="3" name="Inhaltsplatzhalter 2">
+            <a:extLst>
+              <a:ext uri="{FF2B5EF4-FFF2-40B4-BE49-F238E27FC236}">
+                <a16:creationId xmlns:a16="http://schemas.microsoft.com/office/drawing/2014/main" id="{5A35876D-CCCB-4693-3BB9-0B4B22DB6007}"/>
+              </a:ext>
+            </a:extLst>
+          </p:cNvPr>
+          <p:cNvSpPr>
+            <a:spLocks noGrp="1"/>
+          </p:cNvSpPr>
+          <p:nvPr>
+            <p:ph idx="1"/>
+          </p:nvPr>
+        </p:nvSpPr>
+        <p:spPr/>
+        <p:txBody>
+          <a:bodyPr/>
+          <a:lstStyle/>
+          <a:p>
+            <a:r>
+              <a:rPr lang="de-CH" dirty="0"/>
+              <a:t>Was für einen Einfluss hat es auf die Emissionen der Freizeitmobilität, wenn plötzlich 20/40/60% der Autos elektrisch betrieben werden?</a:t>
+            </a:r>
+          </a:p>
+          <a:p>
+            <a:r>
+              <a:rPr lang="de-CH" dirty="0"/>
+              <a:t>Wie viele Emissionen können eingespart werden, wenn die Leute dazu bewegt werden können, für Wege unter 5km, welche bisher mit dem Auto zurückgelegt wurden, neu ein Elektrovelo zu nutzen?</a:t>
+            </a:r>
+          </a:p>
+          <a:p>
+            <a:r>
+              <a:rPr lang="de-CH" dirty="0"/>
+              <a:t>Wie viele Emissionen können eingespart werden, wenn mehr Freizeitwege mit dem öV zurückgelegt werden?</a:t>
+            </a:r>
+          </a:p>
+          <a:p>
+            <a:pPr lvl="1"/>
+            <a:r>
+              <a:rPr lang="de-CH" dirty="0"/>
+              <a:t>Potenzielle öV-Wege anhand Nähe der Ziel- und Startorte zu öV-Haltestellen identifizieren</a:t>
+            </a:r>
+          </a:p>
+          <a:p>
+            <a:endParaRPr lang="de-CH" dirty="0"/>
+          </a:p>
+          <a:p>
+            <a:endParaRPr lang="de-CH" dirty="0"/>
+          </a:p>
+        </p:txBody>
+      </p:sp>
+    </p:spTree>
+    <p:extLst>
+      <p:ext uri="{BB962C8B-B14F-4D97-AF65-F5344CB8AC3E}">
+        <p14:creationId xmlns:p14="http://schemas.microsoft.com/office/powerpoint/2010/main" val="849351401"/>
       </p:ext>
     </p:extLst>
   </p:cSld>

</xml_diff>